<commit_message>
Added script and minor modification to the ppt slides
</commit_message>
<xml_diff>
--- a/CE4062-project.pptx
+++ b/CE4062-project.pptx
@@ -291,7 +291,7 @@
           <a:p>
             <a:fld id="{30C23634-9EB2-44F1-B0F3-0C805B03678A}" type="datetimeFigureOut">
               <a:rPr lang="en-SG" smtClean="0"/>
-              <a:t>27/10/2020</a:t>
+              <a:t>31/10/2020</a:t>
             </a:fld>
             <a:endParaRPr lang="en-SG"/>
           </a:p>
@@ -491,7 +491,7 @@
           <a:p>
             <a:fld id="{30C23634-9EB2-44F1-B0F3-0C805B03678A}" type="datetimeFigureOut">
               <a:rPr lang="en-SG" smtClean="0"/>
-              <a:t>27/10/2020</a:t>
+              <a:t>31/10/2020</a:t>
             </a:fld>
             <a:endParaRPr lang="en-SG"/>
           </a:p>
@@ -701,7 +701,7 @@
           <a:p>
             <a:fld id="{30C23634-9EB2-44F1-B0F3-0C805B03678A}" type="datetimeFigureOut">
               <a:rPr lang="en-SG" smtClean="0"/>
-              <a:t>27/10/2020</a:t>
+              <a:t>31/10/2020</a:t>
             </a:fld>
             <a:endParaRPr lang="en-SG"/>
           </a:p>
@@ -901,7 +901,7 @@
           <a:p>
             <a:fld id="{30C23634-9EB2-44F1-B0F3-0C805B03678A}" type="datetimeFigureOut">
               <a:rPr lang="en-SG" smtClean="0"/>
-              <a:t>27/10/2020</a:t>
+              <a:t>31/10/2020</a:t>
             </a:fld>
             <a:endParaRPr lang="en-SG"/>
           </a:p>
@@ -1177,7 +1177,7 @@
           <a:p>
             <a:fld id="{30C23634-9EB2-44F1-B0F3-0C805B03678A}" type="datetimeFigureOut">
               <a:rPr lang="en-SG" smtClean="0"/>
-              <a:t>27/10/2020</a:t>
+              <a:t>31/10/2020</a:t>
             </a:fld>
             <a:endParaRPr lang="en-SG"/>
           </a:p>
@@ -1445,7 +1445,7 @@
           <a:p>
             <a:fld id="{30C23634-9EB2-44F1-B0F3-0C805B03678A}" type="datetimeFigureOut">
               <a:rPr lang="en-SG" smtClean="0"/>
-              <a:t>27/10/2020</a:t>
+              <a:t>31/10/2020</a:t>
             </a:fld>
             <a:endParaRPr lang="en-SG"/>
           </a:p>
@@ -1860,7 +1860,7 @@
           <a:p>
             <a:fld id="{30C23634-9EB2-44F1-B0F3-0C805B03678A}" type="datetimeFigureOut">
               <a:rPr lang="en-SG" smtClean="0"/>
-              <a:t>27/10/2020</a:t>
+              <a:t>31/10/2020</a:t>
             </a:fld>
             <a:endParaRPr lang="en-SG"/>
           </a:p>
@@ -2002,7 +2002,7 @@
           <a:p>
             <a:fld id="{30C23634-9EB2-44F1-B0F3-0C805B03678A}" type="datetimeFigureOut">
               <a:rPr lang="en-SG" smtClean="0"/>
-              <a:t>27/10/2020</a:t>
+              <a:t>31/10/2020</a:t>
             </a:fld>
             <a:endParaRPr lang="en-SG"/>
           </a:p>
@@ -2115,7 +2115,7 @@
           <a:p>
             <a:fld id="{30C23634-9EB2-44F1-B0F3-0C805B03678A}" type="datetimeFigureOut">
               <a:rPr lang="en-SG" smtClean="0"/>
-              <a:t>27/10/2020</a:t>
+              <a:t>31/10/2020</a:t>
             </a:fld>
             <a:endParaRPr lang="en-SG"/>
           </a:p>
@@ -2428,7 +2428,7 @@
           <a:p>
             <a:fld id="{30C23634-9EB2-44F1-B0F3-0C805B03678A}" type="datetimeFigureOut">
               <a:rPr lang="en-SG" smtClean="0"/>
-              <a:t>27/10/2020</a:t>
+              <a:t>31/10/2020</a:t>
             </a:fld>
             <a:endParaRPr lang="en-SG"/>
           </a:p>
@@ -2717,7 +2717,7 @@
           <a:p>
             <a:fld id="{30C23634-9EB2-44F1-B0F3-0C805B03678A}" type="datetimeFigureOut">
               <a:rPr lang="en-SG" smtClean="0"/>
-              <a:t>27/10/2020</a:t>
+              <a:t>31/10/2020</a:t>
             </a:fld>
             <a:endParaRPr lang="en-SG"/>
           </a:p>
@@ -2960,7 +2960,7 @@
           <a:p>
             <a:fld id="{30C23634-9EB2-44F1-B0F3-0C805B03678A}" type="datetimeFigureOut">
               <a:rPr lang="en-SG" smtClean="0"/>
-              <a:t>27/10/2020</a:t>
+              <a:t>31/10/2020</a:t>
             </a:fld>
             <a:endParaRPr lang="en-SG"/>
           </a:p>
@@ -4863,7 +4863,7 @@
             </a:r>
             <a:r>
               <a:rPr lang="en-SG" dirty="0"/>
-              <a:t> later clarified that the compromised data included payment care expiration dates and Card Verification Value codes (CVV) – A verification code to authenticate a card.</a:t>
+              <a:t> later clarified that the compromised data included payment card expiration dates and Card Verification Value codes (CVV) – A verification code to authenticate a card.</a:t>
             </a:r>
           </a:p>
           <a:p>
@@ -5452,14 +5452,11 @@
           <a:p>
             <a:r>
               <a:rPr lang="en-SG" dirty="0"/>
-              <a:t>The attackers were so sophisticated that they even paid to set up a Secure Sockets Layer (SSL) certificate for their server, a credential that confirms a server has web encryption enabled to protect data in transit.</a:t>
-            </a:r>
-          </a:p>
-          <a:p>
-            <a:r>
-              <a:rPr lang="en-SG" dirty="0"/>
-              <a:t>Attackers of all sorts have increasingly used these certificates to help create a sense of legitimacy, even though an encrypted site might not be necessarily safe.</a:t>
-            </a:r>
+              <a:t>The attackers were so sophisticated that they even paid to set up a Secure Sockets Layer (SSL) certificate for their server, a credential that confirms a server has web encryption enabled to protect data in transit. Attackers of all sorts have increasingly used these certificates to help create a sense of legitimacy, even though an encrypted site might not be necessarily safe.</a:t>
+            </a:r>
+          </a:p>
+          <a:p>
+            <a:endParaRPr lang="en-SG" dirty="0"/>
           </a:p>
         </p:txBody>
       </p:sp>

</xml_diff>